<commit_message>
aws-nuke instructions. doc update. prune unused
</commit_message>
<xml_diff>
--- a/doc/MultiAccount.pptx
+++ b/doc/MultiAccount.pptx
@@ -259,7 +259,7 @@
           <a:p>
             <a:fld id="{BDB006A4-93F4-F145-82E2-04CDA88C15F7}" type="datetimeFigureOut">
               <a:rPr lang="en-US" smtClean="0"/>
-              <a:t>5/3/19</a:t>
+              <a:t>5/6/19</a:t>
             </a:fld>
             <a:endParaRPr lang="en-US"/>
           </a:p>
@@ -457,7 +457,7 @@
           <a:p>
             <a:fld id="{BDB006A4-93F4-F145-82E2-04CDA88C15F7}" type="datetimeFigureOut">
               <a:rPr lang="en-US" smtClean="0"/>
-              <a:t>5/3/19</a:t>
+              <a:t>5/6/19</a:t>
             </a:fld>
             <a:endParaRPr lang="en-US"/>
           </a:p>
@@ -665,7 +665,7 @@
           <a:p>
             <a:fld id="{BDB006A4-93F4-F145-82E2-04CDA88C15F7}" type="datetimeFigureOut">
               <a:rPr lang="en-US" smtClean="0"/>
-              <a:t>5/3/19</a:t>
+              <a:t>5/6/19</a:t>
             </a:fld>
             <a:endParaRPr lang="en-US"/>
           </a:p>
@@ -863,7 +863,7 @@
           <a:p>
             <a:fld id="{BDB006A4-93F4-F145-82E2-04CDA88C15F7}" type="datetimeFigureOut">
               <a:rPr lang="en-US" smtClean="0"/>
-              <a:t>5/3/19</a:t>
+              <a:t>5/6/19</a:t>
             </a:fld>
             <a:endParaRPr lang="en-US"/>
           </a:p>
@@ -1138,7 +1138,7 @@
           <a:p>
             <a:fld id="{BDB006A4-93F4-F145-82E2-04CDA88C15F7}" type="datetimeFigureOut">
               <a:rPr lang="en-US" smtClean="0"/>
-              <a:t>5/3/19</a:t>
+              <a:t>5/6/19</a:t>
             </a:fld>
             <a:endParaRPr lang="en-US"/>
           </a:p>
@@ -1403,7 +1403,7 @@
           <a:p>
             <a:fld id="{BDB006A4-93F4-F145-82E2-04CDA88C15F7}" type="datetimeFigureOut">
               <a:rPr lang="en-US" smtClean="0"/>
-              <a:t>5/3/19</a:t>
+              <a:t>5/6/19</a:t>
             </a:fld>
             <a:endParaRPr lang="en-US"/>
           </a:p>
@@ -1815,7 +1815,7 @@
           <a:p>
             <a:fld id="{BDB006A4-93F4-F145-82E2-04CDA88C15F7}" type="datetimeFigureOut">
               <a:rPr lang="en-US" smtClean="0"/>
-              <a:t>5/3/19</a:t>
+              <a:t>5/6/19</a:t>
             </a:fld>
             <a:endParaRPr lang="en-US"/>
           </a:p>
@@ -1956,7 +1956,7 @@
           <a:p>
             <a:fld id="{BDB006A4-93F4-F145-82E2-04CDA88C15F7}" type="datetimeFigureOut">
               <a:rPr lang="en-US" smtClean="0"/>
-              <a:t>5/3/19</a:t>
+              <a:t>5/6/19</a:t>
             </a:fld>
             <a:endParaRPr lang="en-US"/>
           </a:p>
@@ -2069,7 +2069,7 @@
           <a:p>
             <a:fld id="{BDB006A4-93F4-F145-82E2-04CDA88C15F7}" type="datetimeFigureOut">
               <a:rPr lang="en-US" smtClean="0"/>
-              <a:t>5/3/19</a:t>
+              <a:t>5/6/19</a:t>
             </a:fld>
             <a:endParaRPr lang="en-US"/>
           </a:p>
@@ -2380,7 +2380,7 @@
           <a:p>
             <a:fld id="{BDB006A4-93F4-F145-82E2-04CDA88C15F7}" type="datetimeFigureOut">
               <a:rPr lang="en-US" smtClean="0"/>
-              <a:t>5/3/19</a:t>
+              <a:t>5/6/19</a:t>
             </a:fld>
             <a:endParaRPr lang="en-US"/>
           </a:p>
@@ -2668,7 +2668,7 @@
           <a:p>
             <a:fld id="{BDB006A4-93F4-F145-82E2-04CDA88C15F7}" type="datetimeFigureOut">
               <a:rPr lang="en-US" smtClean="0"/>
-              <a:t>5/3/19</a:t>
+              <a:t>5/6/19</a:t>
             </a:fld>
             <a:endParaRPr lang="en-US"/>
           </a:p>
@@ -2909,7 +2909,7 @@
           <a:p>
             <a:fld id="{BDB006A4-93F4-F145-82E2-04CDA88C15F7}" type="datetimeFigureOut">
               <a:rPr lang="en-US" smtClean="0"/>
-              <a:t>5/3/19</a:t>
+              <a:t>5/6/19</a:t>
             </a:fld>
             <a:endParaRPr lang="en-US"/>
           </a:p>
@@ -4508,45 +4508,6 @@
       </p:cxnSp>
       <p:cxnSp>
         <p:nvCxnSpPr>
-          <p:cNvPr id="71" name="Straight Connector 70">
-            <a:extLst>
-              <a:ext uri="{FF2B5EF4-FFF2-40B4-BE49-F238E27FC236}">
-                <a16:creationId xmlns:a16="http://schemas.microsoft.com/office/drawing/2014/main" id="{753FECD4-3DEF-794D-8274-020F5D4DB4A7}"/>
-              </a:ext>
-            </a:extLst>
-          </p:cNvPr>
-          <p:cNvCxnSpPr>
-            <a:stCxn id="47" idx="3"/>
-            <a:endCxn id="26" idx="1"/>
-          </p:cNvCxnSpPr>
-          <p:nvPr/>
-        </p:nvCxnSpPr>
-        <p:spPr>
-          <a:xfrm>
-            <a:off x="1963713" y="3759205"/>
-            <a:ext cx="822637" cy="1689240"/>
-          </a:xfrm>
-          <a:prstGeom prst="line">
-            <a:avLst/>
-          </a:prstGeom>
-        </p:spPr>
-        <p:style>
-          <a:lnRef idx="1">
-            <a:schemeClr val="accent1"/>
-          </a:lnRef>
-          <a:fillRef idx="0">
-            <a:schemeClr val="accent1"/>
-          </a:fillRef>
-          <a:effectRef idx="0">
-            <a:schemeClr val="accent1"/>
-          </a:effectRef>
-          <a:fontRef idx="minor">
-            <a:schemeClr val="tx1"/>
-          </a:fontRef>
-        </p:style>
-      </p:cxnSp>
-      <p:cxnSp>
-        <p:nvCxnSpPr>
           <p:cNvPr id="77" name="Straight Connector 76">
             <a:extLst>
               <a:ext uri="{FF2B5EF4-FFF2-40B4-BE49-F238E27FC236}">
@@ -4649,6 +4610,50 @@
           <a:prstGeom prst="line">
             <a:avLst/>
           </a:prstGeom>
+        </p:spPr>
+        <p:style>
+          <a:lnRef idx="1">
+            <a:schemeClr val="accent1"/>
+          </a:lnRef>
+          <a:fillRef idx="0">
+            <a:schemeClr val="accent1"/>
+          </a:fillRef>
+          <a:effectRef idx="0">
+            <a:schemeClr val="accent1"/>
+          </a:effectRef>
+          <a:fontRef idx="minor">
+            <a:schemeClr val="tx1"/>
+          </a:fontRef>
+        </p:style>
+      </p:cxnSp>
+      <p:cxnSp>
+        <p:nvCxnSpPr>
+          <p:cNvPr id="3" name="Curved Connector 2">
+            <a:extLst>
+              <a:ext uri="{FF2B5EF4-FFF2-40B4-BE49-F238E27FC236}">
+                <a16:creationId xmlns:a16="http://schemas.microsoft.com/office/drawing/2014/main" id="{98754F1B-153D-104E-AB23-81BA4B78E999}"/>
+              </a:ext>
+            </a:extLst>
+          </p:cNvPr>
+          <p:cNvCxnSpPr>
+            <a:endCxn id="26" idx="1"/>
+          </p:cNvCxnSpPr>
+          <p:nvPr/>
+        </p:nvCxnSpPr>
+        <p:spPr>
+          <a:xfrm rot="5400000">
+            <a:off x="2365918" y="4361954"/>
+            <a:ext cx="1506923" cy="666058"/>
+          </a:xfrm>
+          <a:prstGeom prst="curvedConnector4">
+            <a:avLst>
+              <a:gd name="adj1" fmla="val -1108"/>
+              <a:gd name="adj2" fmla="val 189763"/>
+            </a:avLst>
+          </a:prstGeom>
+          <a:ln>
+            <a:tailEnd type="triangle"/>
+          </a:ln>
         </p:spPr>
         <p:style>
           <a:lnRef idx="1">

</xml_diff>